<commit_message>
fixed formatting in gp01-1
</commit_message>
<xml_diff>
--- a/Slides/Lesson 3.1 How to Design Systems.pptx
+++ b/Slides/Lesson 3.1 How to Design Systems.pptx
@@ -5010,7 +5010,7 @@
             <a:fld id="{CF8F25F6-E1EF-4065-8525-42EDEBD9BD22}" type="datetimeFigureOut">
               <a:rPr lang="en-US" smtClean="0"/>
               <a:pPr/>
-              <a:t>8/2/2017</a:t>
+              <a:t>8/11/2017</a:t>
             </a:fld>
             <a:endParaRPr lang="en-US"/>
           </a:p>
@@ -6095,7 +6095,7 @@
           <a:p>
             <a:fld id="{A63C2178-8CCA-4041-9770-46941EE52DB5}" type="datetime1">
               <a:rPr lang="en-US" smtClean="0"/>
-              <a:t>8/2/2017</a:t>
+              <a:t>8/11/2017</a:t>
             </a:fld>
             <a:endParaRPr lang="en-US"/>
           </a:p>
@@ -6190,7 +6190,7 @@
           <a:p>
             <a:fld id="{0C161806-E715-468D-BE16-87701E4DEEBC}" type="datetime1">
               <a:rPr lang="en-US" smtClean="0"/>
-              <a:t>8/2/2017</a:t>
+              <a:t>8/11/2017</a:t>
             </a:fld>
             <a:endParaRPr lang="en-US"/>
           </a:p>
@@ -6465,7 +6465,7 @@
           <a:p>
             <a:fld id="{A9D8D303-42C4-427F-ABF7-AEFFFE32ED17}" type="datetime1">
               <a:rPr lang="en-US" smtClean="0"/>
-              <a:t>8/2/2017</a:t>
+              <a:t>8/11/2017</a:t>
             </a:fld>
             <a:endParaRPr lang="en-US"/>
           </a:p>
@@ -6717,7 +6717,7 @@
           <a:p>
             <a:fld id="{8881F7A1-287F-44F2-B7D9-DD795EA52044}" type="datetime1">
               <a:rPr lang="en-US" smtClean="0"/>
-              <a:t>8/2/2017</a:t>
+              <a:t>8/11/2017</a:t>
             </a:fld>
             <a:endParaRPr lang="en-US"/>
           </a:p>
@@ -6885,7 +6885,7 @@
           <a:p>
             <a:fld id="{83474B67-F4E7-4DFB-B423-D87208E8E4B0}" type="datetime1">
               <a:rPr lang="en-US" smtClean="0"/>
-              <a:t>8/2/2017</a:t>
+              <a:t>8/11/2017</a:t>
             </a:fld>
             <a:endParaRPr lang="en-US"/>
           </a:p>
@@ -7063,7 +7063,7 @@
           <a:p>
             <a:fld id="{F60F46CE-91A9-441B-A2C8-FCB5990C0EDE}" type="datetime1">
               <a:rPr lang="en-US" smtClean="0"/>
-              <a:t>8/2/2017</a:t>
+              <a:t>8/11/2017</a:t>
             </a:fld>
             <a:endParaRPr lang="en-US"/>
           </a:p>
@@ -7237,7 +7237,7 @@
           <a:p>
             <a:fld id="{B3DFFEBE-01B4-41A8-9B95-B3B902B856D2}" type="datetime1">
               <a:rPr lang="en-US" smtClean="0"/>
-              <a:t>8/2/2017</a:t>
+              <a:t>8/11/2017</a:t>
             </a:fld>
             <a:endParaRPr lang="en-US"/>
           </a:p>
@@ -7410,7 +7410,7 @@
           <a:p>
             <a:fld id="{2A6D6241-06C8-44C3-8021-44489836A6EB}" type="datetime1">
               <a:rPr lang="en-US" smtClean="0"/>
-              <a:t>8/2/2017</a:t>
+              <a:t>8/11/2017</a:t>
             </a:fld>
             <a:endParaRPr lang="en-US"/>
           </a:p>
@@ -7673,7 +7673,7 @@
           <a:p>
             <a:fld id="{CD473BB5-DF40-4CF2-8CE7-6D226E43FF1C}" type="datetime1">
               <a:rPr lang="en-US" smtClean="0"/>
-              <a:t>8/2/2017</a:t>
+              <a:t>8/11/2017</a:t>
             </a:fld>
             <a:endParaRPr lang="en-US"/>
           </a:p>
@@ -7849,7 +7849,7 @@
           <a:p>
             <a:fld id="{F70727AD-60D7-4449-BD5C-671E0F9D77F5}" type="datetime1">
               <a:rPr lang="en-US" smtClean="0"/>
-              <a:t>8/2/2017</a:t>
+              <a:t>8/11/2017</a:t>
             </a:fld>
             <a:endParaRPr lang="en-US"/>
           </a:p>
@@ -8143,7 +8143,7 @@
           <a:p>
             <a:fld id="{D3E92E5D-74F7-4353-A80A-F4D05623AC96}" type="datetime1">
               <a:rPr lang="en-US" smtClean="0"/>
-              <a:t>8/2/2017</a:t>
+              <a:t>8/11/2017</a:t>
             </a:fld>
             <a:endParaRPr lang="en-US"/>
           </a:p>
@@ -8428,7 +8428,7 @@
           <a:p>
             <a:fld id="{6543AFF9-3E5C-4F69-80D4-8BC6FD57BFEF}" type="datetime1">
               <a:rPr lang="en-US" smtClean="0"/>
-              <a:t>8/2/2017</a:t>
+              <a:t>8/11/2017</a:t>
             </a:fld>
             <a:endParaRPr lang="en-US"/>
           </a:p>
@@ -8847,7 +8847,7 @@
           <a:p>
             <a:fld id="{806389F3-E267-4166-96D5-E1B928433BFE}" type="datetime1">
               <a:rPr lang="en-US" smtClean="0"/>
-              <a:t>8/2/2017</a:t>
+              <a:t>8/11/2017</a:t>
             </a:fld>
             <a:endParaRPr lang="en-US"/>
           </a:p>
@@ -8964,7 +8964,7 @@
           <a:p>
             <a:fld id="{1FD6636A-1E59-4641-9B3B-6A1B810E8AEE}" type="datetime1">
               <a:rPr lang="en-US" smtClean="0"/>
-              <a:t>8/2/2017</a:t>
+              <a:t>8/11/2017</a:t>
             </a:fld>
             <a:endParaRPr lang="en-US"/>
           </a:p>
@@ -9187,7 +9187,7 @@
           <a:p>
             <a:fld id="{925A3613-5E0B-4B6E-BE51-1FA4AA29D085}" type="datetime1">
               <a:rPr lang="en-US" smtClean="0"/>
-              <a:t>8/2/2017</a:t>
+              <a:t>8/11/2017</a:t>
             </a:fld>
             <a:endParaRPr lang="en-US"/>
           </a:p>
@@ -10933,10 +10933,6 @@
               </a:rPr>
               <a:t>       (world-paused? w)))</a:t>
             </a:r>
-            <a:endParaRPr lang="en-US" sz="1600" b="1" dirty="0">
-              <a:latin typeface="Consolas" panose="020B0609020204030204" pitchFamily="49" charset="0"/>
-              <a:cs typeface="Courier New" pitchFamily="49" charset="0"/>
-            </a:endParaRPr>
           </a:p>
         </p:txBody>
       </p:sp>
@@ -15114,10 +15110,6 @@
               </a:rPr>
               <a:t>)</a:t>
             </a:r>
-            <a:endParaRPr lang="en-US" sz="2000" b="1" dirty="0">
-              <a:latin typeface="Consolas" pitchFamily="49" charset="0"/>
-              <a:cs typeface="Consolas" pitchFamily="49" charset="0"/>
-            </a:endParaRPr>
           </a:p>
         </p:txBody>
       </p:sp>
@@ -15463,10 +15455,6 @@
               </a:rPr>
               <a:t>)</a:t>
             </a:r>
-            <a:endParaRPr lang="en-US" sz="2000" b="1" dirty="0">
-              <a:latin typeface="Consolas" pitchFamily="49" charset="0"/>
-              <a:cs typeface="Consolas" pitchFamily="49" charset="0"/>
-            </a:endParaRPr>
           </a:p>
         </p:txBody>
       </p:sp>
@@ -16847,14 +16835,7 @@
                 <a:latin typeface="Consolas" pitchFamily="49" charset="0"/>
                 <a:cs typeface="Consolas" pitchFamily="49" charset="0"/>
               </a:rPr>
-              <a:t>    </a:t>
-            </a:r>
-            <a:r>
-              <a:rPr lang="en-US" b="1" dirty="0">
-                <a:latin typeface="Consolas" pitchFamily="49" charset="0"/>
-                <a:cs typeface="Consolas" pitchFamily="49" charset="0"/>
-              </a:rPr>
-              <a:t>"(world-to-scene unpaused-world-at-20) should display as image-at-20")</a:t>
+              <a:t>    "(world-to-scene unpaused-world-at-20) should display as image-at-20")</a:t>
             </a:r>
           </a:p>
           <a:p>
@@ -16911,19 +16892,8 @@
                 <a:latin typeface="Consolas" pitchFamily="49" charset="0"/>
                 <a:cs typeface="Consolas" pitchFamily="49" charset="0"/>
               </a:rPr>
-              <a:t>    </a:t>
-            </a:r>
-            <a:r>
-              <a:rPr lang="en-US" b="1" dirty="0">
-                <a:latin typeface="Consolas" pitchFamily="49" charset="0"/>
-                <a:cs typeface="Consolas" pitchFamily="49" charset="0"/>
-              </a:rPr>
-              <a:t>"(world-to-scene paused-world-at-20) should display as image-at-20"))</a:t>
-            </a:r>
-            <a:endParaRPr lang="en-US" b="1" dirty="0">
-              <a:latin typeface="Consolas" pitchFamily="49" charset="0"/>
-              <a:cs typeface="Consolas" pitchFamily="49" charset="0"/>
-            </a:endParaRPr>
+              <a:t>    "(world-to-scene paused-world-at-20) should display as image-at-20"))</a:t>
+            </a:r>
           </a:p>
           <a:p>
             <a:pPr>
@@ -17622,7 +17592,7 @@
         </p:nvGrpSpPr>
         <p:grpSpPr>
           <a:xfrm>
-            <a:off x="4309533" y="3256491"/>
+            <a:off x="4395258" y="2956564"/>
             <a:ext cx="2438400" cy="762000"/>
             <a:chOff x="6519333" y="3124200"/>
             <a:chExt cx="2438400" cy="762000"/>
@@ -19306,11 +19276,7 @@
           <a:p>
             <a:r>
               <a:rPr lang="en-US" dirty="0"/>
-              <a:t>We used the universe module, which</a:t>
-            </a:r>
-            <a:r>
-              <a:rPr lang="en-US" dirty="0"/>
-              <a:t> provides a way of creating and running an interactive machine.</a:t>
+              <a:t>We used the universe module, which provides a way of creating and running an interactive machine.</a:t>
             </a:r>
           </a:p>
           <a:p>

</xml_diff>